<commit_message>
test path and ppt link updated
</commit_message>
<xml_diff>
--- a/adm-doc/The Sneaker Collector Presentation.pptx
+++ b/adm-doc/The Sneaker Collector Presentation.pptx
@@ -111,6 +111,11 @@
       </a:defRPr>
     </a:lvl9pPr>
   </p:defaultTextStyle>
+  <p:extLst>
+    <p:ext uri="{EFAFB233-063F-42B5-8137-9DF3F51BA10A}">
+      <p15:sldGuideLst xmlns:p15="http://schemas.microsoft.com/office/powerpoint/2012/main"/>
+    </p:ext>
+  </p:extLst>
 </p:presentation>
 </file>
 
@@ -2851,7 +2856,7 @@
           <a:p>
             <a:fld id="{3F35D348-7878-4C90-B6E8-D07263EFAC16}" type="datetimeFigureOut">
               <a:rPr lang="en-CA" smtClean="0"/>
-              <a:t>2021-09-27</a:t>
+              <a:t>2021-10-03</a:t>
             </a:fld>
             <a:endParaRPr lang="en-CA"/>
           </a:p>
@@ -3149,7 +3154,7 @@
           <a:p>
             <a:fld id="{3F35D348-7878-4C90-B6E8-D07263EFAC16}" type="datetimeFigureOut">
               <a:rPr lang="en-CA" smtClean="0"/>
-              <a:t>2021-09-27</a:t>
+              <a:t>2021-10-03</a:t>
             </a:fld>
             <a:endParaRPr lang="en-CA"/>
           </a:p>
@@ -3341,7 +3346,7 @@
           <a:p>
             <a:fld id="{3F35D348-7878-4C90-B6E8-D07263EFAC16}" type="datetimeFigureOut">
               <a:rPr lang="en-CA" smtClean="0"/>
-              <a:t>2021-09-27</a:t>
+              <a:t>2021-10-03</a:t>
             </a:fld>
             <a:endParaRPr lang="en-CA"/>
           </a:p>
@@ -3602,7 +3607,7 @@
           <a:p>
             <a:fld id="{3F35D348-7878-4C90-B6E8-D07263EFAC16}" type="datetimeFigureOut">
               <a:rPr lang="en-CA" smtClean="0"/>
-              <a:t>2021-09-27</a:t>
+              <a:t>2021-10-03</a:t>
             </a:fld>
             <a:endParaRPr lang="en-CA"/>
           </a:p>
@@ -4026,7 +4031,7 @@
           <a:p>
             <a:fld id="{3F35D348-7878-4C90-B6E8-D07263EFAC16}" type="datetimeFigureOut">
               <a:rPr lang="en-CA" smtClean="0"/>
-              <a:t>2021-09-27</a:t>
+              <a:t>2021-10-03</a:t>
             </a:fld>
             <a:endParaRPr lang="en-CA"/>
           </a:p>
@@ -4563,7 +4568,7 @@
           <a:p>
             <a:fld id="{3F35D348-7878-4C90-B6E8-D07263EFAC16}" type="datetimeFigureOut">
               <a:rPr lang="en-CA" smtClean="0"/>
-              <a:t>2021-09-27</a:t>
+              <a:t>2021-10-03</a:t>
             </a:fld>
             <a:endParaRPr lang="en-CA"/>
           </a:p>
@@ -5427,7 +5432,7 @@
           <a:p>
             <a:fld id="{3F35D348-7878-4C90-B6E8-D07263EFAC16}" type="datetimeFigureOut">
               <a:rPr lang="en-CA" smtClean="0"/>
-              <a:t>2021-09-27</a:t>
+              <a:t>2021-10-03</a:t>
             </a:fld>
             <a:endParaRPr lang="en-CA"/>
           </a:p>
@@ -5597,7 +5602,7 @@
           <a:p>
             <a:fld id="{3F35D348-7878-4C90-B6E8-D07263EFAC16}" type="datetimeFigureOut">
               <a:rPr lang="en-CA" smtClean="0"/>
-              <a:t>2021-09-27</a:t>
+              <a:t>2021-10-03</a:t>
             </a:fld>
             <a:endParaRPr lang="en-CA"/>
           </a:p>
@@ -5781,7 +5786,7 @@
           <a:p>
             <a:fld id="{3F35D348-7878-4C90-B6E8-D07263EFAC16}" type="datetimeFigureOut">
               <a:rPr lang="en-CA" smtClean="0"/>
-              <a:t>2021-09-27</a:t>
+              <a:t>2021-10-03</a:t>
             </a:fld>
             <a:endParaRPr lang="en-CA"/>
           </a:p>
@@ -5951,7 +5956,7 @@
           <a:p>
             <a:fld id="{3F35D348-7878-4C90-B6E8-D07263EFAC16}" type="datetimeFigureOut">
               <a:rPr lang="en-CA" smtClean="0"/>
-              <a:t>2021-09-27</a:t>
+              <a:t>2021-10-03</a:t>
             </a:fld>
             <a:endParaRPr lang="en-CA"/>
           </a:p>
@@ -6195,7 +6200,7 @@
           <a:p>
             <a:fld id="{3F35D348-7878-4C90-B6E8-D07263EFAC16}" type="datetimeFigureOut">
               <a:rPr lang="en-CA" smtClean="0"/>
-              <a:t>2021-09-27</a:t>
+              <a:t>2021-10-03</a:t>
             </a:fld>
             <a:endParaRPr lang="en-CA"/>
           </a:p>
@@ -6431,7 +6436,7 @@
           <a:p>
             <a:fld id="{3F35D348-7878-4C90-B6E8-D07263EFAC16}" type="datetimeFigureOut">
               <a:rPr lang="en-CA" smtClean="0"/>
-              <a:t>2021-09-27</a:t>
+              <a:t>2021-10-03</a:t>
             </a:fld>
             <a:endParaRPr lang="en-CA"/>
           </a:p>
@@ -6897,7 +6902,7 @@
           <a:p>
             <a:fld id="{3F35D348-7878-4C90-B6E8-D07263EFAC16}" type="datetimeFigureOut">
               <a:rPr lang="en-CA" smtClean="0"/>
-              <a:t>2021-09-27</a:t>
+              <a:t>2021-10-03</a:t>
             </a:fld>
             <a:endParaRPr lang="en-CA"/>
           </a:p>
@@ -7015,7 +7020,7 @@
           <a:p>
             <a:fld id="{3F35D348-7878-4C90-B6E8-D07263EFAC16}" type="datetimeFigureOut">
               <a:rPr lang="en-CA" smtClean="0"/>
-              <a:t>2021-09-27</a:t>
+              <a:t>2021-10-03</a:t>
             </a:fld>
             <a:endParaRPr lang="en-CA"/>
           </a:p>
@@ -7110,7 +7115,7 @@
           <a:p>
             <a:fld id="{3F35D348-7878-4C90-B6E8-D07263EFAC16}" type="datetimeFigureOut">
               <a:rPr lang="en-CA" smtClean="0"/>
-              <a:t>2021-09-27</a:t>
+              <a:t>2021-10-03</a:t>
             </a:fld>
             <a:endParaRPr lang="en-CA"/>
           </a:p>
@@ -7365,7 +7370,7 @@
           <a:p>
             <a:fld id="{3F35D348-7878-4C90-B6E8-D07263EFAC16}" type="datetimeFigureOut">
               <a:rPr lang="en-CA" smtClean="0"/>
-              <a:t>2021-09-27</a:t>
+              <a:t>2021-10-03</a:t>
             </a:fld>
             <a:endParaRPr lang="en-CA"/>
           </a:p>
@@ -7665,7 +7670,7 @@
           <a:p>
             <a:fld id="{3F35D348-7878-4C90-B6E8-D07263EFAC16}" type="datetimeFigureOut">
               <a:rPr lang="en-CA" smtClean="0"/>
-              <a:t>2021-09-27</a:t>
+              <a:t>2021-10-03</a:t>
             </a:fld>
             <a:endParaRPr lang="en-CA"/>
           </a:p>
@@ -7899,7 +7904,7 @@
           <a:p>
             <a:fld id="{3F35D348-7878-4C90-B6E8-D07263EFAC16}" type="datetimeFigureOut">
               <a:rPr lang="en-CA" smtClean="0"/>
-              <a:t>2021-09-27</a:t>
+              <a:t>2021-10-03</a:t>
             </a:fld>
             <a:endParaRPr lang="en-CA"/>
           </a:p>
@@ -10426,13 +10431,33 @@
                   <a:schemeClr val="accent5"/>
                 </a:solidFill>
               </a:rPr>
-              <a:t>Heroku: </a:t>
-            </a:r>
-            <a:r>
-              <a:rPr lang="en-CA" dirty="0">
+              <a:t>Heroku</a:t>
+            </a:r>
+            <a:r>
+              <a:rPr lang="en-CA">
+                <a:solidFill>
+                  <a:schemeClr val="accent5"/>
+                </a:solidFill>
+              </a:rPr>
+              <a:t>: </a:t>
+            </a:r>
+            <a:r>
+              <a:rPr lang="en-CA" b="0" i="0" u="none" strike="noStrike">
+                <a:effectLst/>
+                <a:latin typeface="-apple-system"/>
                 <a:hlinkClick r:id="rId3"/>
               </a:rPr>
-              <a:t>https://stormy-wave-68711.herokuapp.com/</a:t>
+              <a:t>https://peaceful-fortress-81224.herokuapp.com/</a:t>
+            </a:r>
+            <a:r>
+              <a:rPr lang="en-CA" b="0" i="0">
+                <a:solidFill>
+                  <a:srgbClr val="24292F"/>
+                </a:solidFill>
+                <a:effectLst/>
+                <a:latin typeface="-apple-system"/>
+              </a:rPr>
+              <a:t> </a:t>
             </a:r>
             <a:endParaRPr lang="en-CA" dirty="0"/>
           </a:p>

</xml_diff>